<commit_message>
done part 3, without final part
</commit_message>
<xml_diff>
--- a/images.pptx
+++ b/images.pptx
@@ -13,6 +13,10 @@
     <p:sldId id="261" r:id="rId7"/>
     <p:sldId id="262" r:id="rId8"/>
     <p:sldId id="263" r:id="rId9"/>
+    <p:sldId id="264" r:id="rId10"/>
+    <p:sldId id="265" r:id="rId11"/>
+    <p:sldId id="266" r:id="rId12"/>
+    <p:sldId id="267" r:id="rId13"/>
   </p:sldIdLst>
   <p:sldSz cx="12192000" cy="6858000"/>
   <p:notesSz cx="6858000" cy="9144000"/>
@@ -266,7 +270,7 @@
           <a:p>
             <a:fld id="{09B03F73-A0FF-4140-8365-F3268484F61D}" type="datetimeFigureOut">
               <a:rPr lang="en-US" smtClean="0"/>
-              <a:t>3/20/2025</a:t>
+              <a:t>3/24/2025</a:t>
             </a:fld>
             <a:endParaRPr lang="en-US"/>
           </a:p>
@@ -464,7 +468,7 @@
           <a:p>
             <a:fld id="{09B03F73-A0FF-4140-8365-F3268484F61D}" type="datetimeFigureOut">
               <a:rPr lang="en-US" smtClean="0"/>
-              <a:t>3/20/2025</a:t>
+              <a:t>3/24/2025</a:t>
             </a:fld>
             <a:endParaRPr lang="en-US"/>
           </a:p>
@@ -672,7 +676,7 @@
           <a:p>
             <a:fld id="{09B03F73-A0FF-4140-8365-F3268484F61D}" type="datetimeFigureOut">
               <a:rPr lang="en-US" smtClean="0"/>
-              <a:t>3/20/2025</a:t>
+              <a:t>3/24/2025</a:t>
             </a:fld>
             <a:endParaRPr lang="en-US"/>
           </a:p>
@@ -870,7 +874,7 @@
           <a:p>
             <a:fld id="{09B03F73-A0FF-4140-8365-F3268484F61D}" type="datetimeFigureOut">
               <a:rPr lang="en-US" smtClean="0"/>
-              <a:t>3/20/2025</a:t>
+              <a:t>3/24/2025</a:t>
             </a:fld>
             <a:endParaRPr lang="en-US"/>
           </a:p>
@@ -1145,7 +1149,7 @@
           <a:p>
             <a:fld id="{09B03F73-A0FF-4140-8365-F3268484F61D}" type="datetimeFigureOut">
               <a:rPr lang="en-US" smtClean="0"/>
-              <a:t>3/20/2025</a:t>
+              <a:t>3/24/2025</a:t>
             </a:fld>
             <a:endParaRPr lang="en-US"/>
           </a:p>
@@ -1410,7 +1414,7 @@
           <a:p>
             <a:fld id="{09B03F73-A0FF-4140-8365-F3268484F61D}" type="datetimeFigureOut">
               <a:rPr lang="en-US" smtClean="0"/>
-              <a:t>3/20/2025</a:t>
+              <a:t>3/24/2025</a:t>
             </a:fld>
             <a:endParaRPr lang="en-US"/>
           </a:p>
@@ -1822,7 +1826,7 @@
           <a:p>
             <a:fld id="{09B03F73-A0FF-4140-8365-F3268484F61D}" type="datetimeFigureOut">
               <a:rPr lang="en-US" smtClean="0"/>
-              <a:t>3/20/2025</a:t>
+              <a:t>3/24/2025</a:t>
             </a:fld>
             <a:endParaRPr lang="en-US"/>
           </a:p>
@@ -1963,7 +1967,7 @@
           <a:p>
             <a:fld id="{09B03F73-A0FF-4140-8365-F3268484F61D}" type="datetimeFigureOut">
               <a:rPr lang="en-US" smtClean="0"/>
-              <a:t>3/20/2025</a:t>
+              <a:t>3/24/2025</a:t>
             </a:fld>
             <a:endParaRPr lang="en-US"/>
           </a:p>
@@ -2076,7 +2080,7 @@
           <a:p>
             <a:fld id="{09B03F73-A0FF-4140-8365-F3268484F61D}" type="datetimeFigureOut">
               <a:rPr lang="en-US" smtClean="0"/>
-              <a:t>3/20/2025</a:t>
+              <a:t>3/24/2025</a:t>
             </a:fld>
             <a:endParaRPr lang="en-US"/>
           </a:p>
@@ -2387,7 +2391,7 @@
           <a:p>
             <a:fld id="{09B03F73-A0FF-4140-8365-F3268484F61D}" type="datetimeFigureOut">
               <a:rPr lang="en-US" smtClean="0"/>
-              <a:t>3/20/2025</a:t>
+              <a:t>3/24/2025</a:t>
             </a:fld>
             <a:endParaRPr lang="en-US"/>
           </a:p>
@@ -2675,7 +2679,7 @@
           <a:p>
             <a:fld id="{09B03F73-A0FF-4140-8365-F3268484F61D}" type="datetimeFigureOut">
               <a:rPr lang="en-US" smtClean="0"/>
-              <a:t>3/20/2025</a:t>
+              <a:t>3/24/2025</a:t>
             </a:fld>
             <a:endParaRPr lang="en-US"/>
           </a:p>
@@ -2916,7 +2920,7 @@
           <a:p>
             <a:fld id="{09B03F73-A0FF-4140-8365-F3268484F61D}" type="datetimeFigureOut">
               <a:rPr lang="en-US" smtClean="0"/>
-              <a:t>3/20/2025</a:t>
+              <a:t>3/24/2025</a:t>
             </a:fld>
             <a:endParaRPr lang="en-US"/>
           </a:p>
@@ -3486,6 +3490,456 @@
 </p:sld>
 </file>
 
+<file path=ppt/slides/slide10.xml><?xml version="1.0" encoding="utf-8"?>
+<p:sld xmlns:a="http://schemas.openxmlformats.org/drawingml/2006/main" xmlns:r="http://schemas.openxmlformats.org/officeDocument/2006/relationships" xmlns:p="http://schemas.openxmlformats.org/presentationml/2006/main">
+  <p:cSld>
+    <p:spTree>
+      <p:nvGrpSpPr>
+        <p:cNvPr id="1" name=""/>
+        <p:cNvGrpSpPr/>
+        <p:nvPr/>
+      </p:nvGrpSpPr>
+      <p:grpSpPr>
+        <a:xfrm>
+          <a:off x="0" y="0"/>
+          <a:ext cx="0" cy="0"/>
+          <a:chOff x="0" y="0"/>
+          <a:chExt cx="0" cy="0"/>
+        </a:xfrm>
+      </p:grpSpPr>
+      <p:sp>
+        <p:nvSpPr>
+          <p:cNvPr id="2" name="Title 1">
+            <a:extLst>
+              <a:ext uri="{FF2B5EF4-FFF2-40B4-BE49-F238E27FC236}">
+                <a16:creationId xmlns:a16="http://schemas.microsoft.com/office/drawing/2014/main" id="{570BE5BB-1D63-D356-79CA-CC37CEB65955}"/>
+              </a:ext>
+            </a:extLst>
+          </p:cNvPr>
+          <p:cNvSpPr>
+            <a:spLocks noGrp="1"/>
+          </p:cNvSpPr>
+          <p:nvPr>
+            <p:ph type="title"/>
+          </p:nvPr>
+        </p:nvSpPr>
+        <p:spPr/>
+        <p:txBody>
+          <a:bodyPr/>
+          <a:lstStyle/>
+          <a:p>
+            <a:endParaRPr lang="en-US"/>
+          </a:p>
+        </p:txBody>
+      </p:sp>
+      <p:sp>
+        <p:nvSpPr>
+          <p:cNvPr id="3" name="Content Placeholder 2">
+            <a:extLst>
+              <a:ext uri="{FF2B5EF4-FFF2-40B4-BE49-F238E27FC236}">
+                <a16:creationId xmlns:a16="http://schemas.microsoft.com/office/drawing/2014/main" id="{30F74797-7F99-64C7-A218-AE8F79A37479}"/>
+              </a:ext>
+            </a:extLst>
+          </p:cNvPr>
+          <p:cNvSpPr>
+            <a:spLocks noGrp="1"/>
+          </p:cNvSpPr>
+          <p:nvPr>
+            <p:ph idx="1"/>
+          </p:nvPr>
+        </p:nvSpPr>
+        <p:spPr/>
+        <p:txBody>
+          <a:bodyPr/>
+          <a:lstStyle/>
+          <a:p>
+            <a:endParaRPr lang="en-US"/>
+          </a:p>
+        </p:txBody>
+      </p:sp>
+      <p:pic>
+        <p:nvPicPr>
+          <p:cNvPr id="5" name="Picture 4">
+            <a:extLst>
+              <a:ext uri="{FF2B5EF4-FFF2-40B4-BE49-F238E27FC236}">
+                <a16:creationId xmlns:a16="http://schemas.microsoft.com/office/drawing/2014/main" id="{9B27B7F1-B688-43D5-FE75-4C7209057028}"/>
+              </a:ext>
+            </a:extLst>
+          </p:cNvPr>
+          <p:cNvPicPr>
+            <a:picLocks noChangeAspect="1"/>
+          </p:cNvPicPr>
+          <p:nvPr/>
+        </p:nvPicPr>
+        <p:blipFill>
+          <a:blip r:embed="rId2"/>
+          <a:stretch>
+            <a:fillRect/>
+          </a:stretch>
+        </p:blipFill>
+        <p:spPr>
+          <a:xfrm>
+            <a:off x="0" y="794"/>
+            <a:ext cx="5334000" cy="4000500"/>
+          </a:xfrm>
+          <a:prstGeom prst="rect">
+            <a:avLst/>
+          </a:prstGeom>
+          <a:ln>
+            <a:solidFill>
+              <a:schemeClr val="accent1"/>
+            </a:solidFill>
+          </a:ln>
+        </p:spPr>
+      </p:pic>
+      <p:pic>
+        <p:nvPicPr>
+          <p:cNvPr id="7" name="Picture 6">
+            <a:extLst>
+              <a:ext uri="{FF2B5EF4-FFF2-40B4-BE49-F238E27FC236}">
+                <a16:creationId xmlns:a16="http://schemas.microsoft.com/office/drawing/2014/main" id="{71BF0EBA-9587-A938-BED4-116B16C3C045}"/>
+              </a:ext>
+            </a:extLst>
+          </p:cNvPr>
+          <p:cNvPicPr>
+            <a:picLocks noChangeAspect="1"/>
+          </p:cNvPicPr>
+          <p:nvPr/>
+        </p:nvPicPr>
+        <p:blipFill>
+          <a:blip r:embed="rId3"/>
+          <a:stretch>
+            <a:fillRect/>
+          </a:stretch>
+        </p:blipFill>
+        <p:spPr>
+          <a:xfrm>
+            <a:off x="5334000" y="794"/>
+            <a:ext cx="5334000" cy="4000500"/>
+          </a:xfrm>
+          <a:prstGeom prst="rect">
+            <a:avLst/>
+          </a:prstGeom>
+          <a:ln>
+            <a:solidFill>
+              <a:schemeClr val="accent1"/>
+            </a:solidFill>
+          </a:ln>
+        </p:spPr>
+      </p:pic>
+    </p:spTree>
+    <p:extLst>
+      <p:ext uri="{BB962C8B-B14F-4D97-AF65-F5344CB8AC3E}">
+        <p14:creationId xmlns:p14="http://schemas.microsoft.com/office/powerpoint/2010/main" val="1069734121"/>
+      </p:ext>
+    </p:extLst>
+  </p:cSld>
+  <p:clrMapOvr>
+    <a:masterClrMapping/>
+  </p:clrMapOvr>
+</p:sld>
+</file>
+
+<file path=ppt/slides/slide11.xml><?xml version="1.0" encoding="utf-8"?>
+<p:sld xmlns:a="http://schemas.openxmlformats.org/drawingml/2006/main" xmlns:r="http://schemas.openxmlformats.org/officeDocument/2006/relationships" xmlns:p="http://schemas.openxmlformats.org/presentationml/2006/main">
+  <p:cSld>
+    <p:spTree>
+      <p:nvGrpSpPr>
+        <p:cNvPr id="1" name=""/>
+        <p:cNvGrpSpPr/>
+        <p:nvPr/>
+      </p:nvGrpSpPr>
+      <p:grpSpPr>
+        <a:xfrm>
+          <a:off x="0" y="0"/>
+          <a:ext cx="0" cy="0"/>
+          <a:chOff x="0" y="0"/>
+          <a:chExt cx="0" cy="0"/>
+        </a:xfrm>
+      </p:grpSpPr>
+      <p:sp>
+        <p:nvSpPr>
+          <p:cNvPr id="2" name="Title 1">
+            <a:extLst>
+              <a:ext uri="{FF2B5EF4-FFF2-40B4-BE49-F238E27FC236}">
+                <a16:creationId xmlns:a16="http://schemas.microsoft.com/office/drawing/2014/main" id="{BBE3521C-620E-EFAD-C6C3-8F2773141C5F}"/>
+              </a:ext>
+            </a:extLst>
+          </p:cNvPr>
+          <p:cNvSpPr>
+            <a:spLocks noGrp="1"/>
+          </p:cNvSpPr>
+          <p:nvPr>
+            <p:ph type="title"/>
+          </p:nvPr>
+        </p:nvSpPr>
+        <p:spPr/>
+        <p:txBody>
+          <a:bodyPr/>
+          <a:lstStyle/>
+          <a:p>
+            <a:endParaRPr lang="en-US"/>
+          </a:p>
+        </p:txBody>
+      </p:sp>
+      <p:sp>
+        <p:nvSpPr>
+          <p:cNvPr id="3" name="Content Placeholder 2">
+            <a:extLst>
+              <a:ext uri="{FF2B5EF4-FFF2-40B4-BE49-F238E27FC236}">
+                <a16:creationId xmlns:a16="http://schemas.microsoft.com/office/drawing/2014/main" id="{7A25E63D-7FE3-7A89-A480-582B29380EE2}"/>
+              </a:ext>
+            </a:extLst>
+          </p:cNvPr>
+          <p:cNvSpPr>
+            <a:spLocks noGrp="1"/>
+          </p:cNvSpPr>
+          <p:nvPr>
+            <p:ph idx="1"/>
+          </p:nvPr>
+        </p:nvSpPr>
+        <p:spPr/>
+        <p:txBody>
+          <a:bodyPr/>
+          <a:lstStyle/>
+          <a:p>
+            <a:endParaRPr lang="en-US"/>
+          </a:p>
+        </p:txBody>
+      </p:sp>
+      <p:pic>
+        <p:nvPicPr>
+          <p:cNvPr id="5" name="Picture 4">
+            <a:extLst>
+              <a:ext uri="{FF2B5EF4-FFF2-40B4-BE49-F238E27FC236}">
+                <a16:creationId xmlns:a16="http://schemas.microsoft.com/office/drawing/2014/main" id="{89FBB943-491D-B971-9FAB-68FC1E25C63E}"/>
+              </a:ext>
+            </a:extLst>
+          </p:cNvPr>
+          <p:cNvPicPr>
+            <a:picLocks noChangeAspect="1"/>
+          </p:cNvPicPr>
+          <p:nvPr/>
+        </p:nvPicPr>
+        <p:blipFill>
+          <a:blip r:embed="rId2"/>
+          <a:stretch>
+            <a:fillRect/>
+          </a:stretch>
+        </p:blipFill>
+        <p:spPr>
+          <a:xfrm>
+            <a:off x="0" y="794"/>
+            <a:ext cx="5334000" cy="4000500"/>
+          </a:xfrm>
+          <a:prstGeom prst="rect">
+            <a:avLst/>
+          </a:prstGeom>
+          <a:ln>
+            <a:solidFill>
+              <a:schemeClr val="accent1"/>
+            </a:solidFill>
+          </a:ln>
+        </p:spPr>
+      </p:pic>
+      <p:pic>
+        <p:nvPicPr>
+          <p:cNvPr id="7" name="Picture 6">
+            <a:extLst>
+              <a:ext uri="{FF2B5EF4-FFF2-40B4-BE49-F238E27FC236}">
+                <a16:creationId xmlns:a16="http://schemas.microsoft.com/office/drawing/2014/main" id="{36945AFA-0FF4-E3B7-3935-6B663BEB0BC5}"/>
+              </a:ext>
+            </a:extLst>
+          </p:cNvPr>
+          <p:cNvPicPr>
+            <a:picLocks noChangeAspect="1"/>
+          </p:cNvPicPr>
+          <p:nvPr/>
+        </p:nvPicPr>
+        <p:blipFill>
+          <a:blip r:embed="rId3"/>
+          <a:stretch>
+            <a:fillRect/>
+          </a:stretch>
+        </p:blipFill>
+        <p:spPr>
+          <a:xfrm>
+            <a:off x="5334000" y="794"/>
+            <a:ext cx="5334000" cy="4000500"/>
+          </a:xfrm>
+          <a:prstGeom prst="rect">
+            <a:avLst/>
+          </a:prstGeom>
+          <a:ln>
+            <a:solidFill>
+              <a:schemeClr val="accent1"/>
+            </a:solidFill>
+          </a:ln>
+        </p:spPr>
+      </p:pic>
+    </p:spTree>
+    <p:extLst>
+      <p:ext uri="{BB962C8B-B14F-4D97-AF65-F5344CB8AC3E}">
+        <p14:creationId xmlns:p14="http://schemas.microsoft.com/office/powerpoint/2010/main" val="983976558"/>
+      </p:ext>
+    </p:extLst>
+  </p:cSld>
+  <p:clrMapOvr>
+    <a:masterClrMapping/>
+  </p:clrMapOvr>
+</p:sld>
+</file>
+
+<file path=ppt/slides/slide12.xml><?xml version="1.0" encoding="utf-8"?>
+<p:sld xmlns:a="http://schemas.openxmlformats.org/drawingml/2006/main" xmlns:r="http://schemas.openxmlformats.org/officeDocument/2006/relationships" xmlns:p="http://schemas.openxmlformats.org/presentationml/2006/main">
+  <p:cSld>
+    <p:spTree>
+      <p:nvGrpSpPr>
+        <p:cNvPr id="1" name=""/>
+        <p:cNvGrpSpPr/>
+        <p:nvPr/>
+      </p:nvGrpSpPr>
+      <p:grpSpPr>
+        <a:xfrm>
+          <a:off x="0" y="0"/>
+          <a:ext cx="0" cy="0"/>
+          <a:chOff x="0" y="0"/>
+          <a:chExt cx="0" cy="0"/>
+        </a:xfrm>
+      </p:grpSpPr>
+      <p:sp>
+        <p:nvSpPr>
+          <p:cNvPr id="2" name="Title 1">
+            <a:extLst>
+              <a:ext uri="{FF2B5EF4-FFF2-40B4-BE49-F238E27FC236}">
+                <a16:creationId xmlns:a16="http://schemas.microsoft.com/office/drawing/2014/main" id="{E064A64C-08BA-543D-4EA1-FE020DF73BF7}"/>
+              </a:ext>
+            </a:extLst>
+          </p:cNvPr>
+          <p:cNvSpPr>
+            <a:spLocks noGrp="1"/>
+          </p:cNvSpPr>
+          <p:nvPr>
+            <p:ph type="title"/>
+          </p:nvPr>
+        </p:nvSpPr>
+        <p:spPr/>
+        <p:txBody>
+          <a:bodyPr/>
+          <a:lstStyle/>
+          <a:p>
+            <a:endParaRPr lang="en-US"/>
+          </a:p>
+        </p:txBody>
+      </p:sp>
+      <p:sp>
+        <p:nvSpPr>
+          <p:cNvPr id="3" name="Content Placeholder 2">
+            <a:extLst>
+              <a:ext uri="{FF2B5EF4-FFF2-40B4-BE49-F238E27FC236}">
+                <a16:creationId xmlns:a16="http://schemas.microsoft.com/office/drawing/2014/main" id="{A680562B-C6A4-3EEE-3DB2-CC197D942257}"/>
+              </a:ext>
+            </a:extLst>
+          </p:cNvPr>
+          <p:cNvSpPr>
+            <a:spLocks noGrp="1"/>
+          </p:cNvSpPr>
+          <p:nvPr>
+            <p:ph idx="1"/>
+          </p:nvPr>
+        </p:nvSpPr>
+        <p:spPr/>
+        <p:txBody>
+          <a:bodyPr/>
+          <a:lstStyle/>
+          <a:p>
+            <a:endParaRPr lang="en-US"/>
+          </a:p>
+        </p:txBody>
+      </p:sp>
+      <p:pic>
+        <p:nvPicPr>
+          <p:cNvPr id="5" name="Picture 4">
+            <a:extLst>
+              <a:ext uri="{FF2B5EF4-FFF2-40B4-BE49-F238E27FC236}">
+                <a16:creationId xmlns:a16="http://schemas.microsoft.com/office/drawing/2014/main" id="{ABF00897-F47B-5071-ACD4-7E55EB9B8786}"/>
+              </a:ext>
+            </a:extLst>
+          </p:cNvPr>
+          <p:cNvPicPr>
+            <a:picLocks noChangeAspect="1"/>
+          </p:cNvPicPr>
+          <p:nvPr/>
+        </p:nvPicPr>
+        <p:blipFill>
+          <a:blip r:embed="rId2"/>
+          <a:stretch>
+            <a:fillRect/>
+          </a:stretch>
+        </p:blipFill>
+        <p:spPr>
+          <a:xfrm>
+            <a:off x="5334000" y="794"/>
+            <a:ext cx="5334000" cy="4000500"/>
+          </a:xfrm>
+          <a:prstGeom prst="rect">
+            <a:avLst/>
+          </a:prstGeom>
+          <a:ln>
+            <a:solidFill>
+              <a:schemeClr val="accent1"/>
+            </a:solidFill>
+          </a:ln>
+        </p:spPr>
+      </p:pic>
+      <p:pic>
+        <p:nvPicPr>
+          <p:cNvPr id="7" name="Picture 6">
+            <a:extLst>
+              <a:ext uri="{FF2B5EF4-FFF2-40B4-BE49-F238E27FC236}">
+                <a16:creationId xmlns:a16="http://schemas.microsoft.com/office/drawing/2014/main" id="{3C4D5301-B9BD-3621-47B7-E18D9BB9A579}"/>
+              </a:ext>
+            </a:extLst>
+          </p:cNvPr>
+          <p:cNvPicPr>
+            <a:picLocks noChangeAspect="1"/>
+          </p:cNvPicPr>
+          <p:nvPr/>
+        </p:nvPicPr>
+        <p:blipFill>
+          <a:blip r:embed="rId3"/>
+          <a:stretch>
+            <a:fillRect/>
+          </a:stretch>
+        </p:blipFill>
+        <p:spPr>
+          <a:xfrm>
+            <a:off x="0" y="794"/>
+            <a:ext cx="5334000" cy="4000500"/>
+          </a:xfrm>
+          <a:prstGeom prst="rect">
+            <a:avLst/>
+          </a:prstGeom>
+          <a:ln>
+            <a:solidFill>
+              <a:schemeClr val="accent1"/>
+            </a:solidFill>
+          </a:ln>
+        </p:spPr>
+      </p:pic>
+    </p:spTree>
+    <p:extLst>
+      <p:ext uri="{BB962C8B-B14F-4D97-AF65-F5344CB8AC3E}">
+        <p14:creationId xmlns:p14="http://schemas.microsoft.com/office/powerpoint/2010/main" val="2331014342"/>
+      </p:ext>
+    </p:extLst>
+  </p:cSld>
+  <p:clrMapOvr>
+    <a:masterClrMapping/>
+  </p:clrMapOvr>
+</p:sld>
+</file>
+
 <file path=ppt/slides/slide2.xml><?xml version="1.0" encoding="utf-8"?>
 <p:sld xmlns:a="http://schemas.openxmlformats.org/drawingml/2006/main" xmlns:r="http://schemas.openxmlformats.org/officeDocument/2006/relationships" xmlns:p="http://schemas.openxmlformats.org/presentationml/2006/main">
   <p:cSld>
@@ -3719,7 +4173,7 @@
           <a:bodyPr/>
           <a:lstStyle/>
           <a:p>
-            <a:endParaRPr lang="en-US"/>
+            <a:endParaRPr lang="en-US" dirty="0"/>
           </a:p>
         </p:txBody>
       </p:sp>
@@ -4437,6 +4891,156 @@
     <p:extLst>
       <p:ext uri="{BB962C8B-B14F-4D97-AF65-F5344CB8AC3E}">
         <p14:creationId xmlns:p14="http://schemas.microsoft.com/office/powerpoint/2010/main" val="3653468293"/>
+      </p:ext>
+    </p:extLst>
+  </p:cSld>
+  <p:clrMapOvr>
+    <a:masterClrMapping/>
+  </p:clrMapOvr>
+</p:sld>
+</file>
+
+<file path=ppt/slides/slide9.xml><?xml version="1.0" encoding="utf-8"?>
+<p:sld xmlns:a="http://schemas.openxmlformats.org/drawingml/2006/main" xmlns:r="http://schemas.openxmlformats.org/officeDocument/2006/relationships" xmlns:p="http://schemas.openxmlformats.org/presentationml/2006/main">
+  <p:cSld>
+    <p:spTree>
+      <p:nvGrpSpPr>
+        <p:cNvPr id="1" name=""/>
+        <p:cNvGrpSpPr/>
+        <p:nvPr/>
+      </p:nvGrpSpPr>
+      <p:grpSpPr>
+        <a:xfrm>
+          <a:off x="0" y="0"/>
+          <a:ext cx="0" cy="0"/>
+          <a:chOff x="0" y="0"/>
+          <a:chExt cx="0" cy="0"/>
+        </a:xfrm>
+      </p:grpSpPr>
+      <p:sp>
+        <p:nvSpPr>
+          <p:cNvPr id="2" name="Title 1">
+            <a:extLst>
+              <a:ext uri="{FF2B5EF4-FFF2-40B4-BE49-F238E27FC236}">
+                <a16:creationId xmlns:a16="http://schemas.microsoft.com/office/drawing/2014/main" id="{3F6B8844-C525-A425-38F8-6B37F7BB525C}"/>
+              </a:ext>
+            </a:extLst>
+          </p:cNvPr>
+          <p:cNvSpPr>
+            <a:spLocks noGrp="1"/>
+          </p:cNvSpPr>
+          <p:nvPr>
+            <p:ph type="title"/>
+          </p:nvPr>
+        </p:nvSpPr>
+        <p:spPr/>
+        <p:txBody>
+          <a:bodyPr/>
+          <a:lstStyle/>
+          <a:p>
+            <a:endParaRPr lang="en-US"/>
+          </a:p>
+        </p:txBody>
+      </p:sp>
+      <p:sp>
+        <p:nvSpPr>
+          <p:cNvPr id="3" name="Content Placeholder 2">
+            <a:extLst>
+              <a:ext uri="{FF2B5EF4-FFF2-40B4-BE49-F238E27FC236}">
+                <a16:creationId xmlns:a16="http://schemas.microsoft.com/office/drawing/2014/main" id="{22F67214-4096-216B-7DEF-4E7A02508024}"/>
+              </a:ext>
+            </a:extLst>
+          </p:cNvPr>
+          <p:cNvSpPr>
+            <a:spLocks noGrp="1"/>
+          </p:cNvSpPr>
+          <p:nvPr>
+            <p:ph idx="1"/>
+          </p:nvPr>
+        </p:nvSpPr>
+        <p:spPr/>
+        <p:txBody>
+          <a:bodyPr/>
+          <a:lstStyle/>
+          <a:p>
+            <a:endParaRPr lang="en-US"/>
+          </a:p>
+        </p:txBody>
+      </p:sp>
+      <p:pic>
+        <p:nvPicPr>
+          <p:cNvPr id="7" name="Picture 6">
+            <a:extLst>
+              <a:ext uri="{FF2B5EF4-FFF2-40B4-BE49-F238E27FC236}">
+                <a16:creationId xmlns:a16="http://schemas.microsoft.com/office/drawing/2014/main" id="{9C4D1AA1-AAC1-D905-F38F-48153C8EE853}"/>
+              </a:ext>
+            </a:extLst>
+          </p:cNvPr>
+          <p:cNvPicPr>
+            <a:picLocks noChangeAspect="1"/>
+          </p:cNvPicPr>
+          <p:nvPr/>
+        </p:nvPicPr>
+        <p:blipFill>
+          <a:blip r:embed="rId2"/>
+          <a:stretch>
+            <a:fillRect/>
+          </a:stretch>
+        </p:blipFill>
+        <p:spPr>
+          <a:xfrm>
+            <a:off x="0" y="794"/>
+            <a:ext cx="5334000" cy="4000500"/>
+          </a:xfrm>
+          <a:prstGeom prst="rect">
+            <a:avLst/>
+          </a:prstGeom>
+          <a:ln>
+            <a:solidFill>
+              <a:schemeClr val="accent1"/>
+            </a:solidFill>
+          </a:ln>
+        </p:spPr>
+      </p:pic>
+      <p:pic>
+        <p:nvPicPr>
+          <p:cNvPr id="9" name="Picture 8">
+            <a:extLst>
+              <a:ext uri="{FF2B5EF4-FFF2-40B4-BE49-F238E27FC236}">
+                <a16:creationId xmlns:a16="http://schemas.microsoft.com/office/drawing/2014/main" id="{A25472BA-D7EF-1338-1458-D4659BBC6123}"/>
+              </a:ext>
+            </a:extLst>
+          </p:cNvPr>
+          <p:cNvPicPr>
+            <a:picLocks noChangeAspect="1"/>
+          </p:cNvPicPr>
+          <p:nvPr/>
+        </p:nvPicPr>
+        <p:blipFill>
+          <a:blip r:embed="rId3"/>
+          <a:stretch>
+            <a:fillRect/>
+          </a:stretch>
+        </p:blipFill>
+        <p:spPr>
+          <a:xfrm>
+            <a:off x="5334000" y="0"/>
+            <a:ext cx="5334000" cy="4000500"/>
+          </a:xfrm>
+          <a:prstGeom prst="rect">
+            <a:avLst/>
+          </a:prstGeom>
+          <a:ln>
+            <a:solidFill>
+              <a:schemeClr val="accent1"/>
+            </a:solidFill>
+          </a:ln>
+        </p:spPr>
+      </p:pic>
+    </p:spTree>
+    <p:extLst>
+      <p:ext uri="{BB962C8B-B14F-4D97-AF65-F5344CB8AC3E}">
+        <p14:creationId xmlns:p14="http://schemas.microsoft.com/office/powerpoint/2010/main" val="1584606539"/>
       </p:ext>
     </p:extLst>
   </p:cSld>

</xml_diff>

<commit_message>
(should be) final commit
</commit_message>
<xml_diff>
--- a/images.pptx
+++ b/images.pptx
@@ -17,6 +17,8 @@
     <p:sldId id="265" r:id="rId11"/>
     <p:sldId id="266" r:id="rId12"/>
     <p:sldId id="267" r:id="rId13"/>
+    <p:sldId id="268" r:id="rId14"/>
+    <p:sldId id="269" r:id="rId15"/>
   </p:sldIdLst>
   <p:sldSz cx="12192000" cy="6858000"/>
   <p:notesSz cx="6858000" cy="9144000"/>
@@ -270,7 +272,7 @@
           <a:p>
             <a:fld id="{09B03F73-A0FF-4140-8365-F3268484F61D}" type="datetimeFigureOut">
               <a:rPr lang="en-US" smtClean="0"/>
-              <a:t>3/24/2025</a:t>
+              <a:t>3/25/2025</a:t>
             </a:fld>
             <a:endParaRPr lang="en-US"/>
           </a:p>
@@ -468,7 +470,7 @@
           <a:p>
             <a:fld id="{09B03F73-A0FF-4140-8365-F3268484F61D}" type="datetimeFigureOut">
               <a:rPr lang="en-US" smtClean="0"/>
-              <a:t>3/24/2025</a:t>
+              <a:t>3/25/2025</a:t>
             </a:fld>
             <a:endParaRPr lang="en-US"/>
           </a:p>
@@ -676,7 +678,7 @@
           <a:p>
             <a:fld id="{09B03F73-A0FF-4140-8365-F3268484F61D}" type="datetimeFigureOut">
               <a:rPr lang="en-US" smtClean="0"/>
-              <a:t>3/24/2025</a:t>
+              <a:t>3/25/2025</a:t>
             </a:fld>
             <a:endParaRPr lang="en-US"/>
           </a:p>
@@ -874,7 +876,7 @@
           <a:p>
             <a:fld id="{09B03F73-A0FF-4140-8365-F3268484F61D}" type="datetimeFigureOut">
               <a:rPr lang="en-US" smtClean="0"/>
-              <a:t>3/24/2025</a:t>
+              <a:t>3/25/2025</a:t>
             </a:fld>
             <a:endParaRPr lang="en-US"/>
           </a:p>
@@ -1149,7 +1151,7 @@
           <a:p>
             <a:fld id="{09B03F73-A0FF-4140-8365-F3268484F61D}" type="datetimeFigureOut">
               <a:rPr lang="en-US" smtClean="0"/>
-              <a:t>3/24/2025</a:t>
+              <a:t>3/25/2025</a:t>
             </a:fld>
             <a:endParaRPr lang="en-US"/>
           </a:p>
@@ -1414,7 +1416,7 @@
           <a:p>
             <a:fld id="{09B03F73-A0FF-4140-8365-F3268484F61D}" type="datetimeFigureOut">
               <a:rPr lang="en-US" smtClean="0"/>
-              <a:t>3/24/2025</a:t>
+              <a:t>3/25/2025</a:t>
             </a:fld>
             <a:endParaRPr lang="en-US"/>
           </a:p>
@@ -1826,7 +1828,7 @@
           <a:p>
             <a:fld id="{09B03F73-A0FF-4140-8365-F3268484F61D}" type="datetimeFigureOut">
               <a:rPr lang="en-US" smtClean="0"/>
-              <a:t>3/24/2025</a:t>
+              <a:t>3/25/2025</a:t>
             </a:fld>
             <a:endParaRPr lang="en-US"/>
           </a:p>
@@ -1967,7 +1969,7 @@
           <a:p>
             <a:fld id="{09B03F73-A0FF-4140-8365-F3268484F61D}" type="datetimeFigureOut">
               <a:rPr lang="en-US" smtClean="0"/>
-              <a:t>3/24/2025</a:t>
+              <a:t>3/25/2025</a:t>
             </a:fld>
             <a:endParaRPr lang="en-US"/>
           </a:p>
@@ -2080,7 +2082,7 @@
           <a:p>
             <a:fld id="{09B03F73-A0FF-4140-8365-F3268484F61D}" type="datetimeFigureOut">
               <a:rPr lang="en-US" smtClean="0"/>
-              <a:t>3/24/2025</a:t>
+              <a:t>3/25/2025</a:t>
             </a:fld>
             <a:endParaRPr lang="en-US"/>
           </a:p>
@@ -2391,7 +2393,7 @@
           <a:p>
             <a:fld id="{09B03F73-A0FF-4140-8365-F3268484F61D}" type="datetimeFigureOut">
               <a:rPr lang="en-US" smtClean="0"/>
-              <a:t>3/24/2025</a:t>
+              <a:t>3/25/2025</a:t>
             </a:fld>
             <a:endParaRPr lang="en-US"/>
           </a:p>
@@ -2679,7 +2681,7 @@
           <a:p>
             <a:fld id="{09B03F73-A0FF-4140-8365-F3268484F61D}" type="datetimeFigureOut">
               <a:rPr lang="en-US" smtClean="0"/>
-              <a:t>3/24/2025</a:t>
+              <a:t>3/25/2025</a:t>
             </a:fld>
             <a:endParaRPr lang="en-US"/>
           </a:p>
@@ -2920,7 +2922,7 @@
           <a:p>
             <a:fld id="{09B03F73-A0FF-4140-8365-F3268484F61D}" type="datetimeFigureOut">
               <a:rPr lang="en-US" smtClean="0"/>
-              <a:t>3/24/2025</a:t>
+              <a:t>3/25/2025</a:t>
             </a:fld>
             <a:endParaRPr lang="en-US"/>
           </a:p>
@@ -3931,6 +3933,306 @@
     <p:extLst>
       <p:ext uri="{BB962C8B-B14F-4D97-AF65-F5344CB8AC3E}">
         <p14:creationId xmlns:p14="http://schemas.microsoft.com/office/powerpoint/2010/main" val="2331014342"/>
+      </p:ext>
+    </p:extLst>
+  </p:cSld>
+  <p:clrMapOvr>
+    <a:masterClrMapping/>
+  </p:clrMapOvr>
+</p:sld>
+</file>
+
+<file path=ppt/slides/slide13.xml><?xml version="1.0" encoding="utf-8"?>
+<p:sld xmlns:a="http://schemas.openxmlformats.org/drawingml/2006/main" xmlns:r="http://schemas.openxmlformats.org/officeDocument/2006/relationships" xmlns:p="http://schemas.openxmlformats.org/presentationml/2006/main">
+  <p:cSld>
+    <p:spTree>
+      <p:nvGrpSpPr>
+        <p:cNvPr id="1" name=""/>
+        <p:cNvGrpSpPr/>
+        <p:nvPr/>
+      </p:nvGrpSpPr>
+      <p:grpSpPr>
+        <a:xfrm>
+          <a:off x="0" y="0"/>
+          <a:ext cx="0" cy="0"/>
+          <a:chOff x="0" y="0"/>
+          <a:chExt cx="0" cy="0"/>
+        </a:xfrm>
+      </p:grpSpPr>
+      <p:sp>
+        <p:nvSpPr>
+          <p:cNvPr id="2" name="Title 1">
+            <a:extLst>
+              <a:ext uri="{FF2B5EF4-FFF2-40B4-BE49-F238E27FC236}">
+                <a16:creationId xmlns:a16="http://schemas.microsoft.com/office/drawing/2014/main" id="{0E887B7B-05E0-BE20-219E-E5F2B2604227}"/>
+              </a:ext>
+            </a:extLst>
+          </p:cNvPr>
+          <p:cNvSpPr>
+            <a:spLocks noGrp="1"/>
+          </p:cNvSpPr>
+          <p:nvPr>
+            <p:ph type="title"/>
+          </p:nvPr>
+        </p:nvSpPr>
+        <p:spPr/>
+        <p:txBody>
+          <a:bodyPr/>
+          <a:lstStyle/>
+          <a:p>
+            <a:endParaRPr lang="en-US"/>
+          </a:p>
+        </p:txBody>
+      </p:sp>
+      <p:sp>
+        <p:nvSpPr>
+          <p:cNvPr id="3" name="Content Placeholder 2">
+            <a:extLst>
+              <a:ext uri="{FF2B5EF4-FFF2-40B4-BE49-F238E27FC236}">
+                <a16:creationId xmlns:a16="http://schemas.microsoft.com/office/drawing/2014/main" id="{DF4C6C01-955A-1EE4-7CE4-699FAF70D201}"/>
+              </a:ext>
+            </a:extLst>
+          </p:cNvPr>
+          <p:cNvSpPr>
+            <a:spLocks noGrp="1"/>
+          </p:cNvSpPr>
+          <p:nvPr>
+            <p:ph idx="1"/>
+          </p:nvPr>
+        </p:nvSpPr>
+        <p:spPr/>
+        <p:txBody>
+          <a:bodyPr/>
+          <a:lstStyle/>
+          <a:p>
+            <a:endParaRPr lang="en-US"/>
+          </a:p>
+        </p:txBody>
+      </p:sp>
+      <p:pic>
+        <p:nvPicPr>
+          <p:cNvPr id="7" name="Picture 6">
+            <a:extLst>
+              <a:ext uri="{FF2B5EF4-FFF2-40B4-BE49-F238E27FC236}">
+                <a16:creationId xmlns:a16="http://schemas.microsoft.com/office/drawing/2014/main" id="{BB5DCE17-1005-D87C-FF8B-246981AD24A9}"/>
+              </a:ext>
+            </a:extLst>
+          </p:cNvPr>
+          <p:cNvPicPr>
+            <a:picLocks noChangeAspect="1"/>
+          </p:cNvPicPr>
+          <p:nvPr/>
+        </p:nvPicPr>
+        <p:blipFill>
+          <a:blip r:embed="rId2"/>
+          <a:stretch>
+            <a:fillRect/>
+          </a:stretch>
+        </p:blipFill>
+        <p:spPr>
+          <a:xfrm>
+            <a:off x="5334000" y="0"/>
+            <a:ext cx="5334000" cy="4000500"/>
+          </a:xfrm>
+          <a:prstGeom prst="rect">
+            <a:avLst/>
+          </a:prstGeom>
+          <a:ln>
+            <a:solidFill>
+              <a:schemeClr val="accent1"/>
+            </a:solidFill>
+          </a:ln>
+        </p:spPr>
+      </p:pic>
+      <p:pic>
+        <p:nvPicPr>
+          <p:cNvPr id="9" name="Picture 8">
+            <a:extLst>
+              <a:ext uri="{FF2B5EF4-FFF2-40B4-BE49-F238E27FC236}">
+                <a16:creationId xmlns:a16="http://schemas.microsoft.com/office/drawing/2014/main" id="{7E7D9109-1411-382D-CEA8-BBB574877205}"/>
+              </a:ext>
+            </a:extLst>
+          </p:cNvPr>
+          <p:cNvPicPr>
+            <a:picLocks noChangeAspect="1"/>
+          </p:cNvPicPr>
+          <p:nvPr/>
+        </p:nvPicPr>
+        <p:blipFill>
+          <a:blip r:embed="rId3"/>
+          <a:stretch>
+            <a:fillRect/>
+          </a:stretch>
+        </p:blipFill>
+        <p:spPr>
+          <a:xfrm>
+            <a:off x="0" y="0"/>
+            <a:ext cx="5334000" cy="4000500"/>
+          </a:xfrm>
+          <a:prstGeom prst="rect">
+            <a:avLst/>
+          </a:prstGeom>
+          <a:ln>
+            <a:solidFill>
+              <a:schemeClr val="accent1"/>
+            </a:solidFill>
+          </a:ln>
+        </p:spPr>
+      </p:pic>
+    </p:spTree>
+    <p:extLst>
+      <p:ext uri="{BB962C8B-B14F-4D97-AF65-F5344CB8AC3E}">
+        <p14:creationId xmlns:p14="http://schemas.microsoft.com/office/powerpoint/2010/main" val="984293409"/>
+      </p:ext>
+    </p:extLst>
+  </p:cSld>
+  <p:clrMapOvr>
+    <a:masterClrMapping/>
+  </p:clrMapOvr>
+</p:sld>
+</file>
+
+<file path=ppt/slides/slide14.xml><?xml version="1.0" encoding="utf-8"?>
+<p:sld xmlns:a="http://schemas.openxmlformats.org/drawingml/2006/main" xmlns:r="http://schemas.openxmlformats.org/officeDocument/2006/relationships" xmlns:p="http://schemas.openxmlformats.org/presentationml/2006/main">
+  <p:cSld>
+    <p:spTree>
+      <p:nvGrpSpPr>
+        <p:cNvPr id="1" name=""/>
+        <p:cNvGrpSpPr/>
+        <p:nvPr/>
+      </p:nvGrpSpPr>
+      <p:grpSpPr>
+        <a:xfrm>
+          <a:off x="0" y="0"/>
+          <a:ext cx="0" cy="0"/>
+          <a:chOff x="0" y="0"/>
+          <a:chExt cx="0" cy="0"/>
+        </a:xfrm>
+      </p:grpSpPr>
+      <p:sp>
+        <p:nvSpPr>
+          <p:cNvPr id="2" name="Title 1">
+            <a:extLst>
+              <a:ext uri="{FF2B5EF4-FFF2-40B4-BE49-F238E27FC236}">
+                <a16:creationId xmlns:a16="http://schemas.microsoft.com/office/drawing/2014/main" id="{2C7A2D89-7C45-F05E-B9B5-CFEEAB54E4D7}"/>
+              </a:ext>
+            </a:extLst>
+          </p:cNvPr>
+          <p:cNvSpPr>
+            <a:spLocks noGrp="1"/>
+          </p:cNvSpPr>
+          <p:nvPr>
+            <p:ph type="title"/>
+          </p:nvPr>
+        </p:nvSpPr>
+        <p:spPr/>
+        <p:txBody>
+          <a:bodyPr/>
+          <a:lstStyle/>
+          <a:p>
+            <a:endParaRPr lang="en-US"/>
+          </a:p>
+        </p:txBody>
+      </p:sp>
+      <p:sp>
+        <p:nvSpPr>
+          <p:cNvPr id="3" name="Content Placeholder 2">
+            <a:extLst>
+              <a:ext uri="{FF2B5EF4-FFF2-40B4-BE49-F238E27FC236}">
+                <a16:creationId xmlns:a16="http://schemas.microsoft.com/office/drawing/2014/main" id="{8C857079-BC81-0B95-8754-728D9817B2EC}"/>
+              </a:ext>
+            </a:extLst>
+          </p:cNvPr>
+          <p:cNvSpPr>
+            <a:spLocks noGrp="1"/>
+          </p:cNvSpPr>
+          <p:nvPr>
+            <p:ph idx="1"/>
+          </p:nvPr>
+        </p:nvSpPr>
+        <p:spPr/>
+        <p:txBody>
+          <a:bodyPr/>
+          <a:lstStyle/>
+          <a:p>
+            <a:endParaRPr lang="en-US"/>
+          </a:p>
+        </p:txBody>
+      </p:sp>
+      <p:pic>
+        <p:nvPicPr>
+          <p:cNvPr id="5" name="Picture 4">
+            <a:extLst>
+              <a:ext uri="{FF2B5EF4-FFF2-40B4-BE49-F238E27FC236}">
+                <a16:creationId xmlns:a16="http://schemas.microsoft.com/office/drawing/2014/main" id="{E8A47BE4-CF5A-D293-A29F-97C81CB77AED}"/>
+              </a:ext>
+            </a:extLst>
+          </p:cNvPr>
+          <p:cNvPicPr>
+            <a:picLocks noChangeAspect="1"/>
+          </p:cNvPicPr>
+          <p:nvPr/>
+        </p:nvPicPr>
+        <p:blipFill>
+          <a:blip r:embed="rId2"/>
+          <a:stretch>
+            <a:fillRect/>
+          </a:stretch>
+        </p:blipFill>
+        <p:spPr>
+          <a:xfrm>
+            <a:off x="5334000" y="0"/>
+            <a:ext cx="5334000" cy="4000500"/>
+          </a:xfrm>
+          <a:prstGeom prst="rect">
+            <a:avLst/>
+          </a:prstGeom>
+          <a:ln>
+            <a:solidFill>
+              <a:schemeClr val="accent1"/>
+            </a:solidFill>
+          </a:ln>
+        </p:spPr>
+      </p:pic>
+      <p:pic>
+        <p:nvPicPr>
+          <p:cNvPr id="11" name="Picture 10">
+            <a:extLst>
+              <a:ext uri="{FF2B5EF4-FFF2-40B4-BE49-F238E27FC236}">
+                <a16:creationId xmlns:a16="http://schemas.microsoft.com/office/drawing/2014/main" id="{894606E3-DB36-98D1-3896-122E55CFB5FA}"/>
+              </a:ext>
+            </a:extLst>
+          </p:cNvPr>
+          <p:cNvPicPr>
+            <a:picLocks noChangeAspect="1"/>
+          </p:cNvPicPr>
+          <p:nvPr/>
+        </p:nvPicPr>
+        <p:blipFill>
+          <a:blip r:embed="rId3"/>
+          <a:stretch>
+            <a:fillRect/>
+          </a:stretch>
+        </p:blipFill>
+        <p:spPr>
+          <a:xfrm>
+            <a:off x="0" y="794"/>
+            <a:ext cx="5334000" cy="4000500"/>
+          </a:xfrm>
+          <a:prstGeom prst="rect">
+            <a:avLst/>
+          </a:prstGeom>
+          <a:ln>
+            <a:solidFill>
+              <a:schemeClr val="accent1"/>
+            </a:solidFill>
+          </a:ln>
+        </p:spPr>
+      </p:pic>
+    </p:spTree>
+    <p:extLst>
+      <p:ext uri="{BB962C8B-B14F-4D97-AF65-F5344CB8AC3E}">
+        <p14:creationId xmlns:p14="http://schemas.microsoft.com/office/powerpoint/2010/main" val="101818066"/>
       </p:ext>
     </p:extLst>
   </p:cSld>

</xml_diff>